<commit_message>
Conclusão e análise estatística
</commit_message>
<xml_diff>
--- a/ApresentacaoRibas/conclusao1.pptx
+++ b/ApresentacaoRibas/conclusao1.pptx
@@ -6,6 +6,7 @@
   </p:sldMasterIdLst>
   <p:sldIdLst>
     <p:sldId id="291" r:id="rId2"/>
+    <p:sldId id="292" r:id="rId3"/>
   </p:sldIdLst>
   <p:sldSz cx="12192000" cy="6858000"/>
   <p:notesSz cx="6858000" cy="9144000"/>
@@ -271,7 +272,7 @@
           <a:p>
             <a:fld id="{6AD6EE87-EBD5-4F12-A48A-63ACA297AC8F}" type="datetimeFigureOut">
               <a:rPr lang="en-US" smtClean="0"/>
-              <a:t>7/21/2021</a:t>
+              <a:t>7/22/2021</a:t>
             </a:fld>
             <a:endParaRPr lang="en-US" dirty="0"/>
           </a:p>
@@ -469,7 +470,7 @@
           <a:p>
             <a:fld id="{4CD73815-2707-4475-8F1A-B873CB631BB4}" type="datetimeFigureOut">
               <a:rPr lang="en-US" smtClean="0"/>
-              <a:t>7/21/2021</a:t>
+              <a:t>7/22/2021</a:t>
             </a:fld>
             <a:endParaRPr lang="en-US" dirty="0"/>
           </a:p>
@@ -677,7 +678,7 @@
           <a:p>
             <a:fld id="{2A4AFB99-0EAB-4182-AFF8-E214C82A68F6}" type="datetimeFigureOut">
               <a:rPr lang="en-US" smtClean="0"/>
-              <a:t>7/21/2021</a:t>
+              <a:t>7/22/2021</a:t>
             </a:fld>
             <a:endParaRPr lang="en-US" dirty="0"/>
           </a:p>
@@ -875,7 +876,7 @@
           <a:p>
             <a:fld id="{A5D3794B-289A-4A80-97D7-111025398D45}" type="datetimeFigureOut">
               <a:rPr lang="en-US" smtClean="0"/>
-              <a:t>7/21/2021</a:t>
+              <a:t>7/22/2021</a:t>
             </a:fld>
             <a:endParaRPr lang="en-US" dirty="0"/>
           </a:p>
@@ -1150,7 +1151,7 @@
           <a:p>
             <a:fld id="{5A61015F-7CC6-4D0A-9D87-873EA4C304CC}" type="datetimeFigureOut">
               <a:rPr lang="en-US" smtClean="0"/>
-              <a:t>7/21/2021</a:t>
+              <a:t>7/22/2021</a:t>
             </a:fld>
             <a:endParaRPr lang="en-US" dirty="0"/>
           </a:p>
@@ -1415,7 +1416,7 @@
           <a:p>
             <a:fld id="{93C6A301-0538-44EC-B09D-202E1042A48B}" type="datetimeFigureOut">
               <a:rPr lang="en-US" smtClean="0"/>
-              <a:t>7/21/2021</a:t>
+              <a:t>7/22/2021</a:t>
             </a:fld>
             <a:endParaRPr lang="en-US" dirty="0"/>
           </a:p>
@@ -1827,7 +1828,7 @@
           <a:p>
             <a:fld id="{D789574A-8875-45EF-8EA2-3CAA0F7ABC4C}" type="datetimeFigureOut">
               <a:rPr lang="en-US" smtClean="0"/>
-              <a:t>7/21/2021</a:t>
+              <a:t>7/22/2021</a:t>
             </a:fld>
             <a:endParaRPr lang="en-US" dirty="0"/>
           </a:p>
@@ -1968,7 +1969,7 @@
           <a:p>
             <a:fld id="{67EF4D4C-5367-4C26-9E2B-D8088D7FCA81}" type="datetimeFigureOut">
               <a:rPr lang="en-US" smtClean="0"/>
-              <a:t>7/21/2021</a:t>
+              <a:t>7/22/2021</a:t>
             </a:fld>
             <a:endParaRPr lang="en-US" dirty="0"/>
           </a:p>
@@ -2081,7 +2082,7 @@
           <a:p>
             <a:fld id="{56E91E96-98B0-4413-9547-46F3504108EF}" type="datetimeFigureOut">
               <a:rPr lang="en-US" smtClean="0"/>
-              <a:t>7/21/2021</a:t>
+              <a:t>7/22/2021</a:t>
             </a:fld>
             <a:endParaRPr lang="en-US" dirty="0"/>
           </a:p>
@@ -2392,7 +2393,7 @@
           <a:p>
             <a:fld id="{05C68B11-C5A8-448C-8CE9-B1A273C79CFC}" type="datetimeFigureOut">
               <a:rPr lang="en-US" smtClean="0"/>
-              <a:t>7/21/2021</a:t>
+              <a:t>7/22/2021</a:t>
             </a:fld>
             <a:endParaRPr lang="en-US" dirty="0"/>
           </a:p>
@@ -2681,7 +2682,7 @@
             <a:fld id="{90298CD5-6C1E-4009-B41F-6DF62E31D3BE}" type="datetimeFigureOut">
               <a:rPr lang="en-US" smtClean="0"/>
               <a:pPr/>
-              <a:t>7/21/2021</a:t>
+              <a:t>7/22/2021</a:t>
             </a:fld>
             <a:endParaRPr lang="en-US" dirty="0"/>
           </a:p>
@@ -2924,7 +2925,7 @@
             <a:fld id="{90298CD5-6C1E-4009-B41F-6DF62E31D3BE}" type="datetimeFigureOut">
               <a:rPr lang="en-US" smtClean="0"/>
               <a:pPr/>
-              <a:t>7/21/2021</a:t>
+              <a:t>7/22/2021</a:t>
             </a:fld>
             <a:endParaRPr lang="en-US" dirty="0"/>
           </a:p>
@@ -3541,7 +3542,12 @@
             <p:ph type="title"/>
           </p:nvPr>
         </p:nvSpPr>
-        <p:spPr/>
+        <p:spPr>
+          <a:xfrm>
+            <a:off x="717550" y="266838"/>
+            <a:ext cx="10515600" cy="1325563"/>
+          </a:xfrm>
+        </p:spPr>
         <p:txBody>
           <a:bodyPr/>
           <a:lstStyle/>
@@ -3571,36 +3577,45 @@
         </p:nvSpPr>
         <p:spPr>
           <a:xfrm>
-            <a:off x="838200" y="1825624"/>
+            <a:off x="596900" y="1549400"/>
             <a:ext cx="10756900" cy="4943475"/>
           </a:xfrm>
         </p:spPr>
         <p:txBody>
-          <a:bodyPr/>
-          <a:lstStyle/>
+          <a:bodyPr>
+            <a:normAutofit/>
+          </a:bodyPr>
+          <a:lstStyle/>
+          <a:p>
+            <a:r>
+              <a:rPr lang="pt-BR" sz="2400" b="1" dirty="0"/>
+              <a:t>Neste problema ele foi aplicado para que possa efetuar buscas em espaços diferentes mesmo com soluções iniciais idênticas (Vetor revolver)</a:t>
+            </a:r>
+          </a:p>
           <a:p>
             <a:r>
               <a:rPr lang="pt-BR" sz="2400" dirty="0"/>
-              <a:t>Usar uma reformulação pode trazer resultados significante, mesmo que a reformulação não pareça mudar muito o problema; Prestar atenção ao potencial das propriedades do problema.</a:t>
-            </a:r>
-          </a:p>
-          <a:p>
+              <a:t>Também foi apresentada uma heurística que permite continuar a busca no espaço de solução através de soluções com objetivos empatados, como estratégia para fugir de ótimos locais. (Soft-</a:t>
+            </a:r>
+            <a:r>
+              <a:rPr lang="pt-BR" sz="2400" dirty="0" err="1"/>
+              <a:t>simulated</a:t>
+            </a:r>
             <a:r>
               <a:rPr lang="pt-BR" sz="2400" dirty="0"/>
-              <a:t>Podemos utilizar métodos estatísticos para avaliar diferentes variações das heurísticas; Alto potencial de aplicação em outros trabalhos.</a:t>
-            </a:r>
-          </a:p>
-          <a:p>
+              <a:t> </a:t>
+            </a:r>
+            <a:r>
+              <a:rPr lang="pt-BR" sz="2400" dirty="0" err="1"/>
+              <a:t>annealing</a:t>
+            </a:r>
             <a:r>
               <a:rPr lang="pt-BR" sz="2400" dirty="0"/>
-              <a:t>Podemos melhorar heurísticas através de critérios de desempate dos indicadores utilizados na heurística;</a:t>
-            </a:r>
-          </a:p>
-          <a:p>
-            <a:r>
-              <a:rPr lang="pt-BR" sz="2400" dirty="0"/>
-              <a:t>Após extrair o que foi possível das propriedades e indicadores do problema, o aleatório traz uma oportunidade de melhora.</a:t>
-            </a:r>
+              <a:t>)</a:t>
+            </a:r>
+          </a:p>
+          <a:p>
+            <a:endParaRPr lang="pt-BR" sz="2400" dirty="0"/>
           </a:p>
           <a:p>
             <a:endParaRPr lang="pt-BR" sz="2400" dirty="0"/>
@@ -3620,6 +3635,319 @@
     <p:extLst>
       <p:ext uri="{BB962C8B-B14F-4D97-AF65-F5344CB8AC3E}">
         <p14:creationId xmlns:p14="http://schemas.microsoft.com/office/powerpoint/2010/main" val="3496479770"/>
+      </p:ext>
+    </p:extLst>
+  </p:cSld>
+  <p:clrMapOvr>
+    <a:masterClrMapping/>
+  </p:clrMapOvr>
+</p:sld>
+</file>
+
+<file path=ppt/slides/slide2.xml><?xml version="1.0" encoding="utf-8"?>
+<p:sld xmlns:a="http://schemas.openxmlformats.org/drawingml/2006/main" xmlns:r="http://schemas.openxmlformats.org/officeDocument/2006/relationships" xmlns:p="http://schemas.openxmlformats.org/presentationml/2006/main">
+  <p:cSld>
+    <p:spTree>
+      <p:nvGrpSpPr>
+        <p:cNvPr id="1" name=""/>
+        <p:cNvGrpSpPr/>
+        <p:nvPr/>
+      </p:nvGrpSpPr>
+      <p:grpSpPr>
+        <a:xfrm>
+          <a:off x="0" y="0"/>
+          <a:ext cx="0" cy="0"/>
+          <a:chOff x="0" y="0"/>
+          <a:chExt cx="0" cy="0"/>
+        </a:xfrm>
+      </p:grpSpPr>
+      <p:grpSp>
+        <p:nvGrpSpPr>
+          <p:cNvPr id="15" name="Group 14">
+            <a:extLst>
+              <a:ext uri="{FF2B5EF4-FFF2-40B4-BE49-F238E27FC236}">
+                <a16:creationId xmlns:a16="http://schemas.microsoft.com/office/drawing/2014/main" id="{09A37A38-8CBA-4EE5-89B1-CBDB2D0A6052}"/>
+              </a:ext>
+            </a:extLst>
+          </p:cNvPr>
+          <p:cNvGrpSpPr/>
+          <p:nvPr/>
+        </p:nvGrpSpPr>
+        <p:grpSpPr>
+          <a:xfrm>
+            <a:off x="64602" y="230187"/>
+            <a:ext cx="12127398" cy="1068526"/>
+            <a:chOff x="64602" y="230187"/>
+            <a:chExt cx="12127398" cy="1068526"/>
+          </a:xfrm>
+        </p:grpSpPr>
+        <p:sp>
+          <p:nvSpPr>
+            <p:cNvPr id="16" name="Rectangle 15">
+              <a:extLst>
+                <a:ext uri="{FF2B5EF4-FFF2-40B4-BE49-F238E27FC236}">
+                  <a16:creationId xmlns:a16="http://schemas.microsoft.com/office/drawing/2014/main" id="{99726E38-6374-4D35-8FDD-A2111B222BA4}"/>
+                </a:ext>
+              </a:extLst>
+            </p:cNvPr>
+            <p:cNvSpPr/>
+            <p:nvPr/>
+          </p:nvSpPr>
+          <p:spPr>
+            <a:xfrm>
+              <a:off x="556589" y="230188"/>
+              <a:ext cx="11635411" cy="1068525"/>
+            </a:xfrm>
+            <a:prstGeom prst="rect">
+              <a:avLst/>
+            </a:prstGeom>
+            <a:solidFill>
+              <a:schemeClr val="bg1">
+                <a:lumMod val="95000"/>
+              </a:schemeClr>
+            </a:solidFill>
+            <a:ln>
+              <a:noFill/>
+            </a:ln>
+          </p:spPr>
+          <p:style>
+            <a:lnRef idx="2">
+              <a:schemeClr val="accent1">
+                <a:shade val="50000"/>
+              </a:schemeClr>
+            </a:lnRef>
+            <a:fillRef idx="1">
+              <a:schemeClr val="accent1"/>
+            </a:fillRef>
+            <a:effectRef idx="0">
+              <a:schemeClr val="accent1"/>
+            </a:effectRef>
+            <a:fontRef idx="minor">
+              <a:schemeClr val="lt1"/>
+            </a:fontRef>
+          </p:style>
+          <p:txBody>
+            <a:bodyPr rtlCol="0" anchor="ctr"/>
+            <a:lstStyle/>
+            <a:p>
+              <a:pPr algn="ctr"/>
+              <a:endParaRPr lang="en-US"/>
+            </a:p>
+          </p:txBody>
+        </p:sp>
+        <p:sp>
+          <p:nvSpPr>
+            <p:cNvPr id="17" name="Rectangle 16">
+              <a:extLst>
+                <a:ext uri="{FF2B5EF4-FFF2-40B4-BE49-F238E27FC236}">
+                  <a16:creationId xmlns:a16="http://schemas.microsoft.com/office/drawing/2014/main" id="{809BA0C8-8CA3-43A1-85B7-57AA1DEC97D8}"/>
+                </a:ext>
+              </a:extLst>
+            </p:cNvPr>
+            <p:cNvSpPr/>
+            <p:nvPr/>
+          </p:nvSpPr>
+          <p:spPr>
+            <a:xfrm>
+              <a:off x="304799" y="230188"/>
+              <a:ext cx="172280" cy="1068525"/>
+            </a:xfrm>
+            <a:prstGeom prst="rect">
+              <a:avLst/>
+            </a:prstGeom>
+            <a:solidFill>
+              <a:schemeClr val="bg1">
+                <a:lumMod val="85000"/>
+              </a:schemeClr>
+            </a:solidFill>
+            <a:ln>
+              <a:noFill/>
+            </a:ln>
+          </p:spPr>
+          <p:style>
+            <a:lnRef idx="2">
+              <a:schemeClr val="accent1">
+                <a:shade val="50000"/>
+              </a:schemeClr>
+            </a:lnRef>
+            <a:fillRef idx="1">
+              <a:schemeClr val="accent1"/>
+            </a:fillRef>
+            <a:effectRef idx="0">
+              <a:schemeClr val="accent1"/>
+            </a:effectRef>
+            <a:fontRef idx="minor">
+              <a:schemeClr val="lt1"/>
+            </a:fontRef>
+          </p:style>
+          <p:txBody>
+            <a:bodyPr rtlCol="0" anchor="ctr"/>
+            <a:lstStyle/>
+            <a:p>
+              <a:pPr algn="ctr"/>
+              <a:endParaRPr lang="en-US"/>
+            </a:p>
+          </p:txBody>
+        </p:sp>
+        <p:sp>
+          <p:nvSpPr>
+            <p:cNvPr id="18" name="Rectangle 17">
+              <a:extLst>
+                <a:ext uri="{FF2B5EF4-FFF2-40B4-BE49-F238E27FC236}">
+                  <a16:creationId xmlns:a16="http://schemas.microsoft.com/office/drawing/2014/main" id="{1438C028-A8B0-413B-BFFC-1C8C43493BF8}"/>
+                </a:ext>
+              </a:extLst>
+            </p:cNvPr>
+            <p:cNvSpPr/>
+            <p:nvPr/>
+          </p:nvSpPr>
+          <p:spPr>
+            <a:xfrm>
+              <a:off x="64602" y="230187"/>
+              <a:ext cx="172280" cy="1068525"/>
+            </a:xfrm>
+            <a:prstGeom prst="rect">
+              <a:avLst/>
+            </a:prstGeom>
+            <a:solidFill>
+              <a:schemeClr val="bg1">
+                <a:lumMod val="75000"/>
+              </a:schemeClr>
+            </a:solidFill>
+            <a:ln>
+              <a:noFill/>
+            </a:ln>
+          </p:spPr>
+          <p:style>
+            <a:lnRef idx="2">
+              <a:schemeClr val="accent1">
+                <a:shade val="50000"/>
+              </a:schemeClr>
+            </a:lnRef>
+            <a:fillRef idx="1">
+              <a:schemeClr val="accent1"/>
+            </a:fillRef>
+            <a:effectRef idx="0">
+              <a:schemeClr val="accent1"/>
+            </a:effectRef>
+            <a:fontRef idx="minor">
+              <a:schemeClr val="lt1"/>
+            </a:fontRef>
+          </p:style>
+          <p:txBody>
+            <a:bodyPr rtlCol="0" anchor="ctr"/>
+            <a:lstStyle/>
+            <a:p>
+              <a:pPr algn="ctr"/>
+              <a:endParaRPr lang="en-US"/>
+            </a:p>
+          </p:txBody>
+        </p:sp>
+      </p:grpSp>
+      <p:sp>
+        <p:nvSpPr>
+          <p:cNvPr id="2" name="Title 1">
+            <a:extLst>
+              <a:ext uri="{FF2B5EF4-FFF2-40B4-BE49-F238E27FC236}">
+                <a16:creationId xmlns:a16="http://schemas.microsoft.com/office/drawing/2014/main" id="{43D6345F-DDA8-41BD-9F51-4947FE7D4705}"/>
+              </a:ext>
+            </a:extLst>
+          </p:cNvPr>
+          <p:cNvSpPr>
+            <a:spLocks noGrp="1"/>
+          </p:cNvSpPr>
+          <p:nvPr>
+            <p:ph type="title"/>
+          </p:nvPr>
+        </p:nvSpPr>
+        <p:spPr>
+          <a:xfrm>
+            <a:off x="677239" y="230187"/>
+            <a:ext cx="10515600" cy="1325563"/>
+          </a:xfrm>
+        </p:spPr>
+        <p:txBody>
+          <a:bodyPr/>
+          <a:lstStyle/>
+          <a:p>
+            <a:r>
+              <a:rPr lang="pt-BR" dirty="0"/>
+              <a:t>Conclusão</a:t>
+            </a:r>
+          </a:p>
+        </p:txBody>
+      </p:sp>
+      <p:sp>
+        <p:nvSpPr>
+          <p:cNvPr id="7" name="Content Placeholder 2">
+            <a:extLst>
+              <a:ext uri="{FF2B5EF4-FFF2-40B4-BE49-F238E27FC236}">
+                <a16:creationId xmlns:a16="http://schemas.microsoft.com/office/drawing/2014/main" id="{CCA3FC89-3D06-4372-A1DB-AB1CF845497D}"/>
+              </a:ext>
+            </a:extLst>
+          </p:cNvPr>
+          <p:cNvSpPr>
+            <a:spLocks noGrp="1"/>
+          </p:cNvSpPr>
+          <p:nvPr>
+            <p:ph idx="1"/>
+          </p:nvPr>
+        </p:nvSpPr>
+        <p:spPr>
+          <a:xfrm>
+            <a:off x="556589" y="1684337"/>
+            <a:ext cx="10756900" cy="4943475"/>
+          </a:xfrm>
+        </p:spPr>
+        <p:txBody>
+          <a:bodyPr>
+            <a:normAutofit/>
+          </a:bodyPr>
+          <a:lstStyle/>
+          <a:p>
+            <a:r>
+              <a:rPr lang="pt-BR" sz="2400" dirty="0"/>
+              <a:t>Usar uma reformulação pode trazer resultados significantes, mesmo que a reformulação não pareça mudar muito o problema; </a:t>
+            </a:r>
+            <a:r>
+              <a:rPr lang="pt-BR" sz="2400" b="1" dirty="0"/>
+              <a:t>Prestar atenção ao potencial das propriedades do problema.</a:t>
+            </a:r>
+          </a:p>
+          <a:p>
+            <a:r>
+              <a:rPr lang="pt-BR" sz="2400" dirty="0"/>
+              <a:t>Podemos utilizar métodos estatísticos para avaliar diferentes variações das heurísticas e relação entre heurísticas e parâmetros; </a:t>
+            </a:r>
+            <a:r>
+              <a:rPr lang="pt-BR" sz="2400" b="1" dirty="0"/>
+              <a:t>Alto potencial de aplicação em outros trabalhos.</a:t>
+            </a:r>
+          </a:p>
+          <a:p>
+            <a:r>
+              <a:rPr lang="pt-BR" sz="2400" dirty="0"/>
+              <a:t>Podemos melhorar heurísticas através de critérios de desempate dos indicadores utilizados na heurística;</a:t>
+            </a:r>
+          </a:p>
+          <a:p>
+            <a:endParaRPr lang="pt-BR" sz="2400" dirty="0"/>
+          </a:p>
+          <a:p>
+            <a:endParaRPr lang="pt-BR" sz="2400" dirty="0"/>
+          </a:p>
+          <a:p>
+            <a:pPr marL="0" indent="0">
+              <a:buNone/>
+            </a:pPr>
+            <a:endParaRPr lang="pt-BR" sz="2400" dirty="0"/>
+          </a:p>
+        </p:txBody>
+      </p:sp>
+    </p:spTree>
+    <p:extLst>
+      <p:ext uri="{BB962C8B-B14F-4D97-AF65-F5344CB8AC3E}">
+        <p14:creationId xmlns:p14="http://schemas.microsoft.com/office/powerpoint/2010/main" val="3937938346"/>
       </p:ext>
     </p:extLst>
   </p:cSld>

</xml_diff>